<commit_message>
exemplo de design pattern Observer
</commit_message>
<xml_diff>
--- a/slides/design-patterns.pptx
+++ b/slides/design-patterns.pptx
@@ -296,7 +296,7 @@
             <a:fld id="{2E700DB3-DBF0-4086-B675-117E7A9610B8}" type="datetimeFigureOut">
               <a:rPr lang="pt-BR" smtClean="0"/>
               <a:pPr/>
-              <a:t>30/04/2025</a:t>
+              <a:t>14/05/2025</a:t>
             </a:fld>
             <a:endParaRPr lang="pt-BR"/>
           </a:p>
@@ -463,7 +463,7 @@
             <a:fld id="{2E700DB3-DBF0-4086-B675-117E7A9610B8}" type="datetimeFigureOut">
               <a:rPr lang="pt-BR" smtClean="0"/>
               <a:pPr/>
-              <a:t>30/04/2025</a:t>
+              <a:t>14/05/2025</a:t>
             </a:fld>
             <a:endParaRPr lang="pt-BR"/>
           </a:p>
@@ -640,7 +640,7 @@
             <a:fld id="{2E700DB3-DBF0-4086-B675-117E7A9610B8}" type="datetimeFigureOut">
               <a:rPr lang="pt-BR" smtClean="0"/>
               <a:pPr/>
-              <a:t>30/04/2025</a:t>
+              <a:t>14/05/2025</a:t>
             </a:fld>
             <a:endParaRPr lang="pt-BR"/>
           </a:p>
@@ -807,7 +807,7 @@
             <a:fld id="{2E700DB3-DBF0-4086-B675-117E7A9610B8}" type="datetimeFigureOut">
               <a:rPr lang="pt-BR" smtClean="0"/>
               <a:pPr/>
-              <a:t>30/04/2025</a:t>
+              <a:t>14/05/2025</a:t>
             </a:fld>
             <a:endParaRPr lang="pt-BR"/>
           </a:p>
@@ -1050,7 +1050,7 @@
             <a:fld id="{2E700DB3-DBF0-4086-B675-117E7A9610B8}" type="datetimeFigureOut">
               <a:rPr lang="pt-BR" smtClean="0"/>
               <a:pPr/>
-              <a:t>30/04/2025</a:t>
+              <a:t>14/05/2025</a:t>
             </a:fld>
             <a:endParaRPr lang="pt-BR"/>
           </a:p>
@@ -1335,7 +1335,7 @@
             <a:fld id="{2E700DB3-DBF0-4086-B675-117E7A9610B8}" type="datetimeFigureOut">
               <a:rPr lang="pt-BR" smtClean="0"/>
               <a:pPr/>
-              <a:t>30/04/2025</a:t>
+              <a:t>14/05/2025</a:t>
             </a:fld>
             <a:endParaRPr lang="pt-BR"/>
           </a:p>
@@ -1754,7 +1754,7 @@
             <a:fld id="{2E700DB3-DBF0-4086-B675-117E7A9610B8}" type="datetimeFigureOut">
               <a:rPr lang="pt-BR" smtClean="0"/>
               <a:pPr/>
-              <a:t>30/04/2025</a:t>
+              <a:t>14/05/2025</a:t>
             </a:fld>
             <a:endParaRPr lang="pt-BR"/>
           </a:p>
@@ -1869,7 +1869,7 @@
             <a:fld id="{2E700DB3-DBF0-4086-B675-117E7A9610B8}" type="datetimeFigureOut">
               <a:rPr lang="pt-BR" smtClean="0"/>
               <a:pPr/>
-              <a:t>30/04/2025</a:t>
+              <a:t>14/05/2025</a:t>
             </a:fld>
             <a:endParaRPr lang="pt-BR"/>
           </a:p>
@@ -1961,7 +1961,7 @@
             <a:fld id="{2E700DB3-DBF0-4086-B675-117E7A9610B8}" type="datetimeFigureOut">
               <a:rPr lang="pt-BR" smtClean="0"/>
               <a:pPr/>
-              <a:t>30/04/2025</a:t>
+              <a:t>14/05/2025</a:t>
             </a:fld>
             <a:endParaRPr lang="pt-BR"/>
           </a:p>
@@ -2235,7 +2235,7 @@
             <a:fld id="{2E700DB3-DBF0-4086-B675-117E7A9610B8}" type="datetimeFigureOut">
               <a:rPr lang="pt-BR" smtClean="0"/>
               <a:pPr/>
-              <a:t>30/04/2025</a:t>
+              <a:t>14/05/2025</a:t>
             </a:fld>
             <a:endParaRPr lang="pt-BR"/>
           </a:p>
@@ -2485,7 +2485,7 @@
             <a:fld id="{2E700DB3-DBF0-4086-B675-117E7A9610B8}" type="datetimeFigureOut">
               <a:rPr lang="pt-BR" smtClean="0"/>
               <a:pPr/>
-              <a:t>30/04/2025</a:t>
+              <a:t>14/05/2025</a:t>
             </a:fld>
             <a:endParaRPr lang="pt-BR"/>
           </a:p>
@@ -2695,7 +2695,7 @@
             <a:fld id="{2E700DB3-DBF0-4086-B675-117E7A9610B8}" type="datetimeFigureOut">
               <a:rPr lang="pt-BR" smtClean="0"/>
               <a:pPr/>
-              <a:t>30/04/2025</a:t>
+              <a:t>14/05/2025</a:t>
             </a:fld>
             <a:endParaRPr lang="pt-BR"/>
           </a:p>
@@ -3123,39 +3123,7 @@
                   <a:schemeClr val="tx1"/>
                 </a:solidFill>
               </a:rPr>
-              <a:t>o que é cada um </a:t>
-            </a:r>
-            <a:r>
-              <a:rPr lang="pt-BR" dirty="0" smtClean="0">
-                <a:solidFill>
-                  <a:schemeClr val="tx1"/>
-                </a:solidFill>
-              </a:rPr>
-              <a:t>deles e </a:t>
-            </a:r>
-            <a:r>
-              <a:rPr lang="pt-BR" dirty="0" smtClean="0">
-                <a:solidFill>
-                  <a:schemeClr val="tx1"/>
-                </a:solidFill>
-              </a:rPr>
-              <a:t>como </a:t>
-            </a:r>
-            <a:r>
-              <a:rPr lang="pt-BR" dirty="0" smtClean="0">
-                <a:solidFill>
-                  <a:schemeClr val="tx1"/>
-                </a:solidFill>
-              </a:rPr>
-              <a:t>aplicá-los </a:t>
-            </a:r>
-            <a:r>
-              <a:rPr lang="pt-BR" dirty="0" smtClean="0">
-                <a:solidFill>
-                  <a:schemeClr val="tx1"/>
-                </a:solidFill>
-              </a:rPr>
-              <a:t>em um projeto de software</a:t>
+              <a:t>o que é cada um deles e como aplicá-los em um projeto de software</a:t>
             </a:r>
             <a:endParaRPr lang="pt-BR" dirty="0">
               <a:solidFill>
@@ -3246,11 +3214,7 @@
             </a:r>
             <a:r>
               <a:rPr lang="pt-BR" sz="2400" dirty="0" smtClean="0"/>
-              <a:t> são soluções típicas para problemas comuns em design de software. Eles são como projetos pré-fabricados que você pode personalizar para resolver um problema de design recorrente em seu código</a:t>
-            </a:r>
-            <a:r>
-              <a:rPr lang="pt-BR" sz="2400" dirty="0" smtClean="0"/>
-              <a:t>.</a:t>
+              <a:t> são soluções típicas para problemas comuns em design de software. Eles são como projetos pré-fabricados que você pode personalizar para resolver um problema de design recorrente em seu código.</a:t>
             </a:r>
           </a:p>
           <a:p>
@@ -3262,11 +3226,7 @@
           <a:p>
             <a:r>
               <a:rPr lang="pt-BR" sz="2400" dirty="0" smtClean="0"/>
-              <a:t>O padrão não é um código específico, mas um conceito geral para resolver um problema em particular. Você pode seguir os detalhes do padrão e implementar uma solução que se adapte às realidades do seu próprio programa</a:t>
-            </a:r>
-            <a:r>
-              <a:rPr lang="pt-BR" sz="2400" dirty="0" smtClean="0"/>
-              <a:t>.</a:t>
+              <a:t>O padrão não é um código específico, mas um conceito geral para resolver um problema em particular. Você pode seguir os detalhes do padrão e implementar uma solução que se adapte às realidades do seu próprio programa.</a:t>
             </a:r>
           </a:p>
           <a:p>
@@ -3470,11 +3430,7 @@
             </a:r>
             <a:r>
               <a:rPr lang="pt-BR" sz="2200" dirty="0" smtClean="0"/>
-              <a:t> do padrão descreve brevemente tanto o problema quanto a solução</a:t>
-            </a:r>
-            <a:r>
-              <a:rPr lang="pt-BR" sz="2200" dirty="0" smtClean="0"/>
-              <a:t>.</a:t>
+              <a:t> do padrão descreve brevemente tanto o problema quanto a solução.</a:t>
             </a:r>
           </a:p>
           <a:p>
@@ -3484,11 +3440,7 @@
             </a:r>
             <a:r>
               <a:rPr lang="pt-BR" sz="2200" dirty="0" smtClean="0"/>
-              <a:t> explica ainda mais o problema e a solução que o padrão possibilita</a:t>
-            </a:r>
-            <a:r>
-              <a:rPr lang="pt-BR" sz="2200" dirty="0" smtClean="0"/>
-              <a:t>.</a:t>
+              <a:t> explica ainda mais o problema e a solução que o padrão possibilita.</a:t>
             </a:r>
           </a:p>
           <a:p>
@@ -3498,11 +3450,7 @@
             </a:r>
             <a:r>
               <a:rPr lang="pt-BR" sz="2200" dirty="0" smtClean="0"/>
-              <a:t> das classes mostra cada parte do padrão e como elas estão relacionadas</a:t>
-            </a:r>
-            <a:r>
-              <a:rPr lang="pt-BR" sz="2200" dirty="0" smtClean="0"/>
-              <a:t>.</a:t>
+              <a:t> das classes mostra cada parte do padrão e como elas estão relacionadas.</a:t>
             </a:r>
           </a:p>
           <a:p>
@@ -3613,13 +3561,8 @@
             </a:pPr>
             <a:r>
               <a:rPr lang="pt-BR" sz="2400" dirty="0" smtClean="0"/>
-              <a:t>	Os </a:t>
-            </a:r>
-            <a:r>
-              <a:rPr lang="pt-BR" sz="2400" dirty="0" smtClean="0"/>
-              <a:t>padrões de design diferem por sua complexidade, nível de detalhe e escala de aplicabilidade para todo o sistema que está sendo projetado. </a:t>
-            </a:r>
-            <a:endParaRPr lang="pt-BR" sz="2400" dirty="0" smtClean="0"/>
+              <a:t>	Os padrões de design diferem por sua complexidade, nível de detalhe e escala de aplicabilidade para todo o sistema que está sendo projetado. </a:t>
+            </a:r>
           </a:p>
           <a:p>
             <a:pPr>
@@ -3654,11 +3597,7 @@
             </a:r>
             <a:r>
               <a:rPr lang="pt-BR" sz="2400" dirty="0" smtClean="0"/>
-              <a:t>expressões </a:t>
-            </a:r>
-            <a:r>
-              <a:rPr lang="pt-BR" sz="2400" dirty="0" smtClean="0"/>
-              <a:t>idiomáticas </a:t>
+              <a:t>expressões idiomáticas </a:t>
             </a:r>
             <a:r>
               <a:rPr lang="pt-BR" sz="2400" i="1" dirty="0" smtClean="0"/>
@@ -3666,11 +3605,7 @@
             </a:r>
             <a:r>
               <a:rPr lang="pt-BR" sz="2400" dirty="0" smtClean="0"/>
-              <a:t>. </a:t>
-            </a:r>
-            <a:r>
-              <a:rPr lang="pt-BR" sz="2400" dirty="0" smtClean="0"/>
-              <a:t>Eles geralmente se aplicam apenas a uma única linguagem de programação.</a:t>
+              <a:t>. Eles geralmente se aplicam apenas a uma única linguagem de programação.</a:t>
             </a:r>
           </a:p>
           <a:p>
@@ -3704,11 +3639,7 @@
             </a:r>
             <a:r>
               <a:rPr lang="pt-BR" sz="2400" dirty="0" smtClean="0"/>
-              <a:t>. </a:t>
-            </a:r>
-            <a:r>
-              <a:rPr lang="pt-BR" sz="2400" dirty="0" smtClean="0"/>
-              <a:t>Os desenvolvedores podem implementar esses padrões em praticamente qualquer idioma. Ao contrário de outros padrões, eles podem ser usados para projetar a arquitetura de uma aplicação inteira.</a:t>
+              <a:t>. Os desenvolvedores podem implementar esses padrões em praticamente qualquer idioma. Ao contrário de outros padrões, eles podem ser usados para projetar a arquitetura de uma aplicação inteira.</a:t>
             </a:r>
             <a:endParaRPr lang="pt-BR" sz="2400" dirty="0"/>
           </a:p>
@@ -3778,11 +3709,7 @@
             </a:br>
             <a:r>
               <a:rPr lang="pt-BR" sz="2200" dirty="0" smtClean="0"/>
-              <a:t>Os </a:t>
-            </a:r>
-            <a:r>
-              <a:rPr lang="pt-BR" sz="2200" dirty="0" smtClean="0"/>
-              <a:t>padrões de design podem ser divididos em três tipos:</a:t>
+              <a:t>Os padrões de design podem ser divididos em três tipos:</a:t>
             </a:r>
             <a:r>
               <a:rPr lang="pt-BR" dirty="0" smtClean="0"/>
@@ -3851,7 +3778,6 @@
               <a:rPr lang="pt-BR" sz="2400" dirty="0" smtClean="0"/>
               <a:t> fornecem mecanismos de criação de objetos que aumentam a flexibilidade e a reutilização do código existente.</a:t>
             </a:r>
-            <a:endParaRPr lang="pt-BR" sz="2400" dirty="0" smtClean="0"/>
           </a:p>
           <a:p>
             <a:r>
@@ -3874,7 +3800,6 @@
               <a:rPr lang="pt-BR" sz="2400" dirty="0" smtClean="0"/>
               <a:t>Os padrões estruturais explicam como montar objetos e classes em estruturas maiores, mantendo essas estruturas flexíveis e eficientes.</a:t>
             </a:r>
-            <a:endParaRPr lang="pt-BR" sz="2400" dirty="0" smtClean="0"/>
           </a:p>
           <a:p>
             <a:r>
@@ -3934,9 +3859,23 @@
         </p:nvSpPr>
         <p:spPr/>
         <p:txBody>
-          <a:bodyPr/>
-          <a:lstStyle/>
-          <a:p>
+          <a:bodyPr>
+            <a:normAutofit fontScale="90000"/>
+          </a:bodyPr>
+          <a:lstStyle/>
+          <a:p>
+            <a:r>
+              <a:rPr lang="pt-BR" dirty="0" smtClean="0"/>
+              <a:t>Exemplo pr</a:t>
+            </a:r>
+            <a:r>
+              <a:rPr lang="pt-BR" dirty="0" smtClean="0"/>
+              <a:t>ático de um design </a:t>
+            </a:r>
+            <a:r>
+              <a:rPr lang="pt-BR" dirty="0" err="1" smtClean="0"/>
+              <a:t>pattern</a:t>
+            </a:r>
             <a:endParaRPr lang="pt-BR" dirty="0"/>
           </a:p>
         </p:txBody>
@@ -3956,7 +3895,7 @@
           <a:bodyPr/>
           <a:lstStyle/>
           <a:p>
-            <a:endParaRPr lang="pt-BR"/>
+            <a:endParaRPr lang="pt-BR" dirty="0"/>
           </a:p>
         </p:txBody>
       </p:sp>
@@ -4029,13 +3968,7 @@
               <a:rPr lang="pt-BR" sz="2000" dirty="0" smtClean="0">
                 <a:hlinkClick r:id="rId2"/>
               </a:rPr>
-              <a:t>https://</a:t>
-            </a:r>
-            <a:r>
-              <a:rPr lang="pt-BR" sz="2000" dirty="0" smtClean="0">
-                <a:hlinkClick r:id="rId2"/>
-              </a:rPr>
-              <a:t>refactoring.guru/design-patterns/php</a:t>
+              <a:t>https://refactoring.guru/design-patterns/php</a:t>
             </a:r>
             <a:endParaRPr lang="pt-BR" sz="2000" dirty="0" smtClean="0"/>
           </a:p>

</xml_diff>

<commit_message>
adicao do exemplo observer no slide design-pattern
</commit_message>
<xml_diff>
--- a/slides/design-patterns.pptx
+++ b/slides/design-patterns.pptx
@@ -12,7 +12,11 @@
     <p:sldId id="261" r:id="rId6"/>
     <p:sldId id="262" r:id="rId7"/>
     <p:sldId id="263" r:id="rId8"/>
-    <p:sldId id="257" r:id="rId9"/>
+    <p:sldId id="264" r:id="rId9"/>
+    <p:sldId id="265" r:id="rId10"/>
+    <p:sldId id="266" r:id="rId11"/>
+    <p:sldId id="267" r:id="rId12"/>
+    <p:sldId id="257" r:id="rId13"/>
   </p:sldIdLst>
   <p:sldSz cx="9144000" cy="6858000" type="screen4x3"/>
   <p:notesSz cx="6858000" cy="9144000"/>
@@ -296,7 +300,7 @@
             <a:fld id="{2E700DB3-DBF0-4086-B675-117E7A9610B8}" type="datetimeFigureOut">
               <a:rPr lang="pt-BR" smtClean="0"/>
               <a:pPr/>
-              <a:t>14/05/2025</a:t>
+              <a:t>15/05/2025</a:t>
             </a:fld>
             <a:endParaRPr lang="pt-BR"/>
           </a:p>
@@ -463,7 +467,7 @@
             <a:fld id="{2E700DB3-DBF0-4086-B675-117E7A9610B8}" type="datetimeFigureOut">
               <a:rPr lang="pt-BR" smtClean="0"/>
               <a:pPr/>
-              <a:t>14/05/2025</a:t>
+              <a:t>15/05/2025</a:t>
             </a:fld>
             <a:endParaRPr lang="pt-BR"/>
           </a:p>
@@ -640,7 +644,7 @@
             <a:fld id="{2E700DB3-DBF0-4086-B675-117E7A9610B8}" type="datetimeFigureOut">
               <a:rPr lang="pt-BR" smtClean="0"/>
               <a:pPr/>
-              <a:t>14/05/2025</a:t>
+              <a:t>15/05/2025</a:t>
             </a:fld>
             <a:endParaRPr lang="pt-BR"/>
           </a:p>
@@ -807,7 +811,7 @@
             <a:fld id="{2E700DB3-DBF0-4086-B675-117E7A9610B8}" type="datetimeFigureOut">
               <a:rPr lang="pt-BR" smtClean="0"/>
               <a:pPr/>
-              <a:t>14/05/2025</a:t>
+              <a:t>15/05/2025</a:t>
             </a:fld>
             <a:endParaRPr lang="pt-BR"/>
           </a:p>
@@ -1050,7 +1054,7 @@
             <a:fld id="{2E700DB3-DBF0-4086-B675-117E7A9610B8}" type="datetimeFigureOut">
               <a:rPr lang="pt-BR" smtClean="0"/>
               <a:pPr/>
-              <a:t>14/05/2025</a:t>
+              <a:t>15/05/2025</a:t>
             </a:fld>
             <a:endParaRPr lang="pt-BR"/>
           </a:p>
@@ -1335,7 +1339,7 @@
             <a:fld id="{2E700DB3-DBF0-4086-B675-117E7A9610B8}" type="datetimeFigureOut">
               <a:rPr lang="pt-BR" smtClean="0"/>
               <a:pPr/>
-              <a:t>14/05/2025</a:t>
+              <a:t>15/05/2025</a:t>
             </a:fld>
             <a:endParaRPr lang="pt-BR"/>
           </a:p>
@@ -1754,7 +1758,7 @@
             <a:fld id="{2E700DB3-DBF0-4086-B675-117E7A9610B8}" type="datetimeFigureOut">
               <a:rPr lang="pt-BR" smtClean="0"/>
               <a:pPr/>
-              <a:t>14/05/2025</a:t>
+              <a:t>15/05/2025</a:t>
             </a:fld>
             <a:endParaRPr lang="pt-BR"/>
           </a:p>
@@ -1869,7 +1873,7 @@
             <a:fld id="{2E700DB3-DBF0-4086-B675-117E7A9610B8}" type="datetimeFigureOut">
               <a:rPr lang="pt-BR" smtClean="0"/>
               <a:pPr/>
-              <a:t>14/05/2025</a:t>
+              <a:t>15/05/2025</a:t>
             </a:fld>
             <a:endParaRPr lang="pt-BR"/>
           </a:p>
@@ -1961,7 +1965,7 @@
             <a:fld id="{2E700DB3-DBF0-4086-B675-117E7A9610B8}" type="datetimeFigureOut">
               <a:rPr lang="pt-BR" smtClean="0"/>
               <a:pPr/>
-              <a:t>14/05/2025</a:t>
+              <a:t>15/05/2025</a:t>
             </a:fld>
             <a:endParaRPr lang="pt-BR"/>
           </a:p>
@@ -2235,7 +2239,7 @@
             <a:fld id="{2E700DB3-DBF0-4086-B675-117E7A9610B8}" type="datetimeFigureOut">
               <a:rPr lang="pt-BR" smtClean="0"/>
               <a:pPr/>
-              <a:t>14/05/2025</a:t>
+              <a:t>15/05/2025</a:t>
             </a:fld>
             <a:endParaRPr lang="pt-BR"/>
           </a:p>
@@ -2485,7 +2489,7 @@
             <a:fld id="{2E700DB3-DBF0-4086-B675-117E7A9610B8}" type="datetimeFigureOut">
               <a:rPr lang="pt-BR" smtClean="0"/>
               <a:pPr/>
-              <a:t>14/05/2025</a:t>
+              <a:t>15/05/2025</a:t>
             </a:fld>
             <a:endParaRPr lang="pt-BR"/>
           </a:p>
@@ -2695,7 +2699,7 @@
             <a:fld id="{2E700DB3-DBF0-4086-B675-117E7A9610B8}" type="datetimeFigureOut">
               <a:rPr lang="pt-BR" smtClean="0"/>
               <a:pPr/>
-              <a:t>14/05/2025</a:t>
+              <a:t>15/05/2025</a:t>
             </a:fld>
             <a:endParaRPr lang="pt-BR"/>
           </a:p>
@@ -3141,6 +3145,581 @@
 </p:sld>
 </file>
 
+<file path=ppt/slides/slide10.xml><?xml version="1.0" encoding="utf-8"?>
+<p:sld xmlns:a="http://schemas.openxmlformats.org/drawingml/2006/main" xmlns:r="http://schemas.openxmlformats.org/officeDocument/2006/relationships" xmlns:p="http://schemas.openxmlformats.org/presentationml/2006/main">
+  <p:cSld>
+    <p:spTree>
+      <p:nvGrpSpPr>
+        <p:cNvPr id="1" name=""/>
+        <p:cNvGrpSpPr/>
+        <p:nvPr/>
+      </p:nvGrpSpPr>
+      <p:grpSpPr>
+        <a:xfrm>
+          <a:off x="0" y="0"/>
+          <a:ext cx="0" cy="0"/>
+          <a:chOff x="0" y="0"/>
+          <a:chExt cx="0" cy="0"/>
+        </a:xfrm>
+      </p:grpSpPr>
+      <p:sp>
+        <p:nvSpPr>
+          <p:cNvPr id="2" name="Título 1"/>
+          <p:cNvSpPr>
+            <a:spLocks noGrp="1"/>
+          </p:cNvSpPr>
+          <p:nvPr>
+            <p:ph type="title"/>
+          </p:nvPr>
+        </p:nvSpPr>
+        <p:spPr/>
+        <p:txBody>
+          <a:bodyPr/>
+          <a:lstStyle/>
+          <a:p>
+            <a:r>
+              <a:rPr lang="pt-BR" dirty="0" smtClean="0"/>
+              <a:t>Estrutura do </a:t>
+            </a:r>
+            <a:r>
+              <a:rPr lang="pt-BR" dirty="0" err="1" smtClean="0"/>
+              <a:t>Observer</a:t>
+            </a:r>
+            <a:endParaRPr lang="pt-BR" dirty="0"/>
+          </a:p>
+        </p:txBody>
+      </p:sp>
+      <p:sp>
+        <p:nvSpPr>
+          <p:cNvPr id="3" name="Espaço Reservado para Conteúdo 2"/>
+          <p:cNvSpPr>
+            <a:spLocks noGrp="1"/>
+          </p:cNvSpPr>
+          <p:nvPr>
+            <p:ph idx="1"/>
+          </p:nvPr>
+        </p:nvSpPr>
+        <p:spPr>
+          <a:xfrm>
+            <a:off x="457200" y="1600200"/>
+            <a:ext cx="3328982" cy="4525963"/>
+          </a:xfrm>
+        </p:spPr>
+        <p:txBody>
+          <a:bodyPr>
+            <a:normAutofit/>
+          </a:bodyPr>
+          <a:lstStyle/>
+          <a:p>
+            <a:pPr>
+              <a:buNone/>
+            </a:pPr>
+            <a:r>
+              <a:rPr lang="pt-BR" sz="2000" dirty="0" smtClean="0"/>
+              <a:t>A estrutura básica do padrão é a seguinte: </a:t>
+            </a:r>
+          </a:p>
+          <a:p>
+            <a:r>
+              <a:rPr lang="pt-BR" sz="2000" b="1" dirty="0" smtClean="0"/>
+              <a:t>2. </a:t>
+            </a:r>
+            <a:r>
+              <a:rPr lang="pt-BR" sz="2000" b="1" dirty="0" err="1" smtClean="0"/>
+              <a:t>Observer</a:t>
+            </a:r>
+            <a:r>
+              <a:rPr lang="pt-BR" sz="2000" b="1" dirty="0" smtClean="0"/>
+              <a:t> (Observador)</a:t>
+            </a:r>
+          </a:p>
+          <a:p>
+            <a:r>
+              <a:rPr lang="pt-BR" sz="2000" dirty="0" smtClean="0"/>
+              <a:t>Define uma interface (ou contrato) com um método de atualização, como:</a:t>
+            </a:r>
+          </a:p>
+          <a:p>
+            <a:pPr lvl="1"/>
+            <a:r>
+              <a:rPr lang="pt-BR" sz="2000" dirty="0" smtClean="0"/>
+              <a:t>atualizar() ou </a:t>
+            </a:r>
+            <a:r>
+              <a:rPr lang="pt-BR" sz="2000" dirty="0" err="1" smtClean="0"/>
+              <a:t>onNotify</a:t>
+            </a:r>
+            <a:r>
+              <a:rPr lang="pt-BR" sz="2000" dirty="0" smtClean="0"/>
+              <a:t>()</a:t>
+            </a:r>
+          </a:p>
+          <a:p>
+            <a:r>
+              <a:rPr lang="pt-BR" sz="2000" dirty="0" smtClean="0"/>
+              <a:t>Cada </a:t>
+            </a:r>
+            <a:r>
+              <a:rPr lang="pt-BR" sz="2000" dirty="0" err="1" smtClean="0"/>
+              <a:t>observer</a:t>
+            </a:r>
+            <a:r>
+              <a:rPr lang="pt-BR" sz="2000" dirty="0" smtClean="0"/>
+              <a:t> concreto implementa sua própria reação às mudanças do </a:t>
+            </a:r>
+            <a:r>
+              <a:rPr lang="pt-BR" sz="2000" dirty="0" err="1" smtClean="0"/>
+              <a:t>Subject</a:t>
+            </a:r>
+            <a:r>
+              <a:rPr lang="pt-BR" sz="2000" dirty="0" smtClean="0"/>
+              <a:t>.</a:t>
+            </a:r>
+          </a:p>
+          <a:p>
+            <a:pPr>
+              <a:buNone/>
+            </a:pPr>
+            <a:endParaRPr lang="pt-BR" dirty="0" smtClean="0"/>
+          </a:p>
+          <a:p>
+            <a:pPr>
+              <a:buNone/>
+            </a:pPr>
+            <a:endParaRPr lang="pt-BR" dirty="0"/>
+          </a:p>
+        </p:txBody>
+      </p:sp>
+      <p:sp>
+        <p:nvSpPr>
+          <p:cNvPr id="5" name="CaixaDeTexto 4"/>
+          <p:cNvSpPr txBox="1"/>
+          <p:nvPr/>
+        </p:nvSpPr>
+        <p:spPr>
+          <a:xfrm>
+            <a:off x="4500562" y="1285860"/>
+            <a:ext cx="4071966" cy="461665"/>
+          </a:xfrm>
+          <a:prstGeom prst="rect">
+            <a:avLst/>
+          </a:prstGeom>
+          <a:noFill/>
+        </p:spPr>
+        <p:txBody>
+          <a:bodyPr wrap="square" rtlCol="0">
+            <a:spAutoFit/>
+          </a:bodyPr>
+          <a:lstStyle/>
+          <a:p>
+            <a:pPr algn="ctr"/>
+            <a:r>
+              <a:rPr lang="pt-BR" sz="2400" dirty="0" err="1" smtClean="0"/>
+              <a:t>Observer</a:t>
+            </a:r>
+            <a:r>
+              <a:rPr lang="pt-BR" sz="2400" dirty="0" smtClean="0"/>
+              <a:t>.</a:t>
+            </a:r>
+            <a:r>
+              <a:rPr lang="pt-BR" sz="2400" dirty="0" err="1" smtClean="0"/>
+              <a:t>php</a:t>
+            </a:r>
+            <a:endParaRPr lang="pt-BR" sz="2400" dirty="0"/>
+          </a:p>
+        </p:txBody>
+      </p:sp>
+      <p:pic>
+        <p:nvPicPr>
+          <p:cNvPr id="2050" name="Picture 2"/>
+          <p:cNvPicPr>
+            <a:picLocks noChangeAspect="1" noChangeArrowheads="1"/>
+          </p:cNvPicPr>
+          <p:nvPr/>
+        </p:nvPicPr>
+        <p:blipFill>
+          <a:blip r:embed="rId2"/>
+          <a:srcRect/>
+          <a:stretch>
+            <a:fillRect/>
+          </a:stretch>
+        </p:blipFill>
+        <p:spPr bwMode="auto">
+          <a:xfrm>
+            <a:off x="4214810" y="1785926"/>
+            <a:ext cx="4681566" cy="3429024"/>
+          </a:xfrm>
+          <a:prstGeom prst="rect">
+            <a:avLst/>
+          </a:prstGeom>
+          <a:noFill/>
+          <a:ln w="9525">
+            <a:noFill/>
+            <a:miter lim="800000"/>
+            <a:headEnd/>
+            <a:tailEnd/>
+          </a:ln>
+          <a:effectLst/>
+        </p:spPr>
+      </p:pic>
+    </p:spTree>
+  </p:cSld>
+  <p:clrMapOvr>
+    <a:masterClrMapping/>
+  </p:clrMapOvr>
+</p:sld>
+</file>
+
+<file path=ppt/slides/slide11.xml><?xml version="1.0" encoding="utf-8"?>
+<p:sld xmlns:a="http://schemas.openxmlformats.org/drawingml/2006/main" xmlns:r="http://schemas.openxmlformats.org/officeDocument/2006/relationships" xmlns:p="http://schemas.openxmlformats.org/presentationml/2006/main">
+  <p:cSld>
+    <p:spTree>
+      <p:nvGrpSpPr>
+        <p:cNvPr id="1" name=""/>
+        <p:cNvGrpSpPr/>
+        <p:nvPr/>
+      </p:nvGrpSpPr>
+      <p:grpSpPr>
+        <a:xfrm>
+          <a:off x="0" y="0"/>
+          <a:ext cx="0" cy="0"/>
+          <a:chOff x="0" y="0"/>
+          <a:chExt cx="0" cy="0"/>
+        </a:xfrm>
+      </p:grpSpPr>
+      <p:sp>
+        <p:nvSpPr>
+          <p:cNvPr id="2" name="Título 1"/>
+          <p:cNvSpPr>
+            <a:spLocks noGrp="1"/>
+          </p:cNvSpPr>
+          <p:nvPr>
+            <p:ph type="title"/>
+          </p:nvPr>
+        </p:nvSpPr>
+        <p:spPr/>
+        <p:txBody>
+          <a:bodyPr/>
+          <a:lstStyle/>
+          <a:p>
+            <a:r>
+              <a:rPr lang="pt-BR" dirty="0" smtClean="0"/>
+              <a:t>Estrutura do </a:t>
+            </a:r>
+            <a:r>
+              <a:rPr lang="pt-BR" dirty="0" err="1" smtClean="0"/>
+              <a:t>Observer</a:t>
+            </a:r>
+            <a:endParaRPr lang="pt-BR" dirty="0"/>
+          </a:p>
+        </p:txBody>
+      </p:sp>
+      <p:sp>
+        <p:nvSpPr>
+          <p:cNvPr id="3" name="Espaço Reservado para Conteúdo 2"/>
+          <p:cNvSpPr>
+            <a:spLocks noGrp="1"/>
+          </p:cNvSpPr>
+          <p:nvPr>
+            <p:ph idx="1"/>
+          </p:nvPr>
+        </p:nvSpPr>
+        <p:spPr>
+          <a:xfrm>
+            <a:off x="428596" y="1285861"/>
+            <a:ext cx="8258204" cy="1571636"/>
+          </a:xfrm>
+        </p:spPr>
+        <p:txBody>
+          <a:bodyPr>
+            <a:normAutofit/>
+          </a:bodyPr>
+          <a:lstStyle/>
+          <a:p>
+            <a:r>
+              <a:rPr lang="pt-BR" sz="2000" b="1" dirty="0" smtClean="0"/>
+              <a:t>Fluxo Básico</a:t>
+            </a:r>
+          </a:p>
+          <a:p>
+            <a:r>
+              <a:rPr lang="pt-BR" sz="2000" dirty="0" smtClean="0"/>
+              <a:t>O </a:t>
+            </a:r>
+            <a:r>
+              <a:rPr lang="pt-BR" sz="2000" dirty="0" err="1" smtClean="0"/>
+              <a:t>Subject</a:t>
+            </a:r>
+            <a:r>
+              <a:rPr lang="pt-BR" sz="2000" dirty="0" smtClean="0"/>
+              <a:t> muda de estado.</a:t>
+            </a:r>
+          </a:p>
+          <a:p>
+            <a:r>
+              <a:rPr lang="pt-BR" sz="2000" dirty="0" smtClean="0"/>
+              <a:t>Chama </a:t>
+            </a:r>
+            <a:r>
+              <a:rPr lang="pt-BR" sz="2000" dirty="0" err="1" smtClean="0"/>
+              <a:t>notificarObservers</a:t>
+            </a:r>
+            <a:r>
+              <a:rPr lang="pt-BR" sz="2000" dirty="0" smtClean="0"/>
+              <a:t>().</a:t>
+            </a:r>
+          </a:p>
+          <a:p>
+            <a:r>
+              <a:rPr lang="pt-BR" sz="2000" dirty="0" smtClean="0"/>
+              <a:t>Cada </a:t>
+            </a:r>
+            <a:r>
+              <a:rPr lang="pt-BR" sz="2000" dirty="0" err="1" smtClean="0"/>
+              <a:t>observer</a:t>
+            </a:r>
+            <a:r>
+              <a:rPr lang="pt-BR" sz="2000" dirty="0" smtClean="0"/>
+              <a:t> na lista executa seu método de atualização </a:t>
+            </a:r>
+            <a:r>
+              <a:rPr lang="pt-BR" sz="2000" dirty="0" smtClean="0"/>
+              <a:t>(</a:t>
+            </a:r>
+            <a:r>
+              <a:rPr lang="pt-BR" sz="2000" dirty="0" err="1" smtClean="0"/>
+              <a:t>update</a:t>
+            </a:r>
+            <a:r>
+              <a:rPr lang="pt-BR" sz="2000" dirty="0" smtClean="0"/>
+              <a:t>()).</a:t>
+            </a:r>
+            <a:endParaRPr lang="pt-BR" sz="2000" dirty="0" smtClean="0"/>
+          </a:p>
+          <a:p>
+            <a:pPr>
+              <a:buNone/>
+            </a:pPr>
+            <a:endParaRPr lang="pt-BR" dirty="0" smtClean="0"/>
+          </a:p>
+          <a:p>
+            <a:pPr>
+              <a:buNone/>
+            </a:pPr>
+            <a:endParaRPr lang="pt-BR" dirty="0"/>
+          </a:p>
+        </p:txBody>
+      </p:sp>
+      <p:pic>
+        <p:nvPicPr>
+          <p:cNvPr id="3074" name="Picture 2"/>
+          <p:cNvPicPr>
+            <a:picLocks noChangeAspect="1" noChangeArrowheads="1"/>
+          </p:cNvPicPr>
+          <p:nvPr/>
+        </p:nvPicPr>
+        <p:blipFill>
+          <a:blip r:embed="rId2"/>
+          <a:srcRect/>
+          <a:stretch>
+            <a:fillRect/>
+          </a:stretch>
+        </p:blipFill>
+        <p:spPr bwMode="auto">
+          <a:xfrm>
+            <a:off x="571472" y="3000372"/>
+            <a:ext cx="2562225" cy="3190875"/>
+          </a:xfrm>
+          <a:prstGeom prst="rect">
+            <a:avLst/>
+          </a:prstGeom>
+          <a:noFill/>
+          <a:ln w="9525">
+            <a:noFill/>
+            <a:miter lim="800000"/>
+            <a:headEnd/>
+            <a:tailEnd/>
+          </a:ln>
+          <a:effectLst/>
+        </p:spPr>
+      </p:pic>
+      <p:pic>
+        <p:nvPicPr>
+          <p:cNvPr id="3076" name="Picture 4"/>
+          <p:cNvPicPr>
+            <a:picLocks noChangeAspect="1" noChangeArrowheads="1"/>
+          </p:cNvPicPr>
+          <p:nvPr/>
+        </p:nvPicPr>
+        <p:blipFill>
+          <a:blip r:embed="rId3"/>
+          <a:srcRect/>
+          <a:stretch>
+            <a:fillRect/>
+          </a:stretch>
+        </p:blipFill>
+        <p:spPr bwMode="auto">
+          <a:xfrm>
+            <a:off x="4572000" y="3643314"/>
+            <a:ext cx="4214842" cy="1882029"/>
+          </a:xfrm>
+          <a:prstGeom prst="rect">
+            <a:avLst/>
+          </a:prstGeom>
+          <a:noFill/>
+          <a:ln w="9525">
+            <a:noFill/>
+            <a:miter lim="800000"/>
+            <a:headEnd/>
+            <a:tailEnd/>
+          </a:ln>
+          <a:effectLst/>
+        </p:spPr>
+      </p:pic>
+      <p:cxnSp>
+        <p:nvCxnSpPr>
+          <p:cNvPr id="10" name="Conector de seta reta 9"/>
+          <p:cNvCxnSpPr>
+            <a:stCxn id="3074" idx="3"/>
+            <a:endCxn id="3076" idx="1"/>
+          </p:cNvCxnSpPr>
+          <p:nvPr/>
+        </p:nvCxnSpPr>
+        <p:spPr>
+          <a:xfrm flipV="1">
+            <a:off x="3133697" y="4584329"/>
+            <a:ext cx="1438303" cy="11481"/>
+          </a:xfrm>
+          <a:prstGeom prst="straightConnector1">
+            <a:avLst/>
+          </a:prstGeom>
+          <a:ln w="50800">
+            <a:solidFill>
+              <a:schemeClr val="tx1"/>
+            </a:solidFill>
+            <a:tailEnd type="arrow"/>
+          </a:ln>
+        </p:spPr>
+        <p:style>
+          <a:lnRef idx="1">
+            <a:schemeClr val="accent1"/>
+          </a:lnRef>
+          <a:fillRef idx="0">
+            <a:schemeClr val="accent1"/>
+          </a:fillRef>
+          <a:effectRef idx="0">
+            <a:schemeClr val="accent1"/>
+          </a:effectRef>
+          <a:fontRef idx="minor">
+            <a:schemeClr val="tx1"/>
+          </a:fontRef>
+        </p:style>
+      </p:cxnSp>
+    </p:spTree>
+  </p:cSld>
+  <p:clrMapOvr>
+    <a:masterClrMapping/>
+  </p:clrMapOvr>
+</p:sld>
+</file>
+
+<file path=ppt/slides/slide12.xml><?xml version="1.0" encoding="utf-8"?>
+<p:sld xmlns:a="http://schemas.openxmlformats.org/drawingml/2006/main" xmlns:r="http://schemas.openxmlformats.org/officeDocument/2006/relationships" xmlns:p="http://schemas.openxmlformats.org/presentationml/2006/main">
+  <p:cSld>
+    <p:spTree>
+      <p:nvGrpSpPr>
+        <p:cNvPr id="1" name=""/>
+        <p:cNvGrpSpPr/>
+        <p:nvPr/>
+      </p:nvGrpSpPr>
+      <p:grpSpPr>
+        <a:xfrm>
+          <a:off x="0" y="0"/>
+          <a:ext cx="0" cy="0"/>
+          <a:chOff x="0" y="0"/>
+          <a:chExt cx="0" cy="0"/>
+        </a:xfrm>
+      </p:grpSpPr>
+      <p:sp>
+        <p:nvSpPr>
+          <p:cNvPr id="2" name="Título 1"/>
+          <p:cNvSpPr>
+            <a:spLocks noGrp="1"/>
+          </p:cNvSpPr>
+          <p:nvPr>
+            <p:ph type="title"/>
+          </p:nvPr>
+        </p:nvSpPr>
+        <p:spPr/>
+        <p:txBody>
+          <a:bodyPr/>
+          <a:lstStyle/>
+          <a:p>
+            <a:r>
+              <a:rPr lang="pt-BR" dirty="0" smtClean="0"/>
+              <a:t>Referências </a:t>
+            </a:r>
+            <a:endParaRPr lang="pt-BR" dirty="0"/>
+          </a:p>
+        </p:txBody>
+      </p:sp>
+      <p:sp>
+        <p:nvSpPr>
+          <p:cNvPr id="3" name="Espaço Reservado para Conteúdo 2"/>
+          <p:cNvSpPr>
+            <a:spLocks noGrp="1"/>
+          </p:cNvSpPr>
+          <p:nvPr>
+            <p:ph idx="1"/>
+          </p:nvPr>
+        </p:nvSpPr>
+        <p:spPr/>
+        <p:txBody>
+          <a:bodyPr>
+            <a:normAutofit/>
+          </a:bodyPr>
+          <a:lstStyle/>
+          <a:p>
+            <a:r>
+              <a:rPr lang="pt-BR" sz="2000" dirty="0" smtClean="0">
+                <a:hlinkClick r:id="rId2"/>
+              </a:rPr>
+              <a:t>https://refactoring.guru/design-patterns/php</a:t>
+            </a:r>
+            <a:endParaRPr lang="pt-BR" sz="2000" dirty="0" smtClean="0"/>
+          </a:p>
+          <a:p>
+            <a:r>
+              <a:rPr lang="pt-BR" sz="2000" dirty="0" smtClean="0">
+                <a:hlinkClick r:id="rId3"/>
+              </a:rPr>
+              <a:t>https://</a:t>
+            </a:r>
+            <a:r>
+              <a:rPr lang="pt-BR" sz="2000" dirty="0" smtClean="0">
+                <a:hlinkClick r:id="rId3"/>
+              </a:rPr>
+              <a:t>refactoring.guru/design-patterns/what-is-pattern</a:t>
+            </a:r>
+            <a:endParaRPr lang="pt-BR" sz="2000" dirty="0" smtClean="0"/>
+          </a:p>
+          <a:p>
+            <a:r>
+              <a:rPr lang="pt-BR" sz="2000" dirty="0" smtClean="0"/>
+              <a:t>https://refactoring.guru/pt-br/design-patterns/observer</a:t>
+            </a:r>
+            <a:endParaRPr lang="pt-BR" sz="2000" dirty="0"/>
+          </a:p>
+        </p:txBody>
+      </p:sp>
+    </p:spTree>
+  </p:cSld>
+  <p:clrMapOvr>
+    <a:masterClrMapping/>
+  </p:clrMapOvr>
+</p:sld>
+</file>
+
 <file path=ppt/slides/slide2.xml><?xml version="1.0" encoding="utf-8"?>
 <p:sld xmlns:a="http://schemas.openxmlformats.org/drawingml/2006/main" xmlns:r="http://schemas.openxmlformats.org/officeDocument/2006/relationships" xmlns:p="http://schemas.openxmlformats.org/presentationml/2006/main">
   <p:cSld>
@@ -3866,11 +4445,7 @@
           <a:p>
             <a:r>
               <a:rPr lang="pt-BR" dirty="0" smtClean="0"/>
-              <a:t>Exemplo pr</a:t>
-            </a:r>
-            <a:r>
-              <a:rPr lang="pt-BR" dirty="0" smtClean="0"/>
-              <a:t>ático de um design </a:t>
+              <a:t>Exemplo prático de um design </a:t>
             </a:r>
             <a:r>
               <a:rPr lang="pt-BR" dirty="0" err="1" smtClean="0"/>
@@ -3892,10 +4467,88 @@
         </p:nvSpPr>
         <p:spPr/>
         <p:txBody>
-          <a:bodyPr/>
-          <a:lstStyle/>
-          <a:p>
-            <a:endParaRPr lang="pt-BR" dirty="0"/>
+          <a:bodyPr>
+            <a:normAutofit/>
+          </a:bodyPr>
+          <a:lstStyle/>
+          <a:p>
+            <a:r>
+              <a:rPr lang="pt-BR" sz="2400" dirty="0" smtClean="0"/>
+              <a:t>Neste exemplo, utilizaremos o padrão de design comportamental </a:t>
+            </a:r>
+            <a:r>
+              <a:rPr lang="pt-BR" sz="2400" b="1" dirty="0" err="1" smtClean="0"/>
+              <a:t>Observer</a:t>
+            </a:r>
+            <a:r>
+              <a:rPr lang="pt-BR" sz="2400" dirty="0" smtClean="0"/>
+              <a:t>, também conhecido como </a:t>
+            </a:r>
+            <a:r>
+              <a:rPr lang="pt-BR" sz="2400" dirty="0" err="1" smtClean="0"/>
+              <a:t>Listener</a:t>
+            </a:r>
+            <a:r>
+              <a:rPr lang="pt-BR" sz="2400" dirty="0" smtClean="0"/>
+              <a:t> </a:t>
+            </a:r>
+            <a:r>
+              <a:rPr lang="pt-BR" sz="2400" dirty="0" smtClean="0"/>
+              <a:t>ou </a:t>
+            </a:r>
+            <a:r>
+              <a:rPr lang="pt-BR" sz="2400" dirty="0" err="1" smtClean="0"/>
+              <a:t>Event-Subscriber</a:t>
+            </a:r>
+            <a:r>
+              <a:rPr lang="pt-BR" sz="2400" dirty="0" smtClean="0"/>
+              <a:t>.</a:t>
+            </a:r>
+          </a:p>
+          <a:p>
+            <a:r>
+              <a:rPr lang="pt-BR" sz="2400" dirty="0" smtClean="0"/>
+              <a:t>O </a:t>
+            </a:r>
+            <a:r>
+              <a:rPr lang="pt-BR" sz="2400" b="1" dirty="0" err="1" smtClean="0"/>
+              <a:t>Observer</a:t>
+            </a:r>
+            <a:r>
+              <a:rPr lang="pt-BR" sz="2400" dirty="0" smtClean="0"/>
+              <a:t> é um padrão de projeto comportamental que permite que você defina um mecanismo de assinatura para notificar múltiplos objetos sobre quaisquer eventos que aconteçam com o objeto que eles estão observando.</a:t>
+            </a:r>
+            <a:endParaRPr lang="pt-BR" sz="2400" dirty="0" smtClean="0"/>
+          </a:p>
+          <a:p>
+            <a:r>
+              <a:rPr lang="pt-BR" sz="2400" dirty="0" smtClean="0"/>
+              <a:t>O código exemplo está em </a:t>
+            </a:r>
+            <a:r>
+              <a:rPr lang="pt-BR" sz="2400" b="1" dirty="0" smtClean="0"/>
+              <a:t>scripts/</a:t>
+            </a:r>
+            <a:r>
+              <a:rPr lang="pt-BR" sz="2400" b="1" dirty="0" err="1" smtClean="0"/>
+              <a:t>observer</a:t>
+            </a:r>
+            <a:r>
+              <a:rPr lang="pt-BR" sz="2400" b="1" dirty="0" smtClean="0"/>
+              <a:t>.</a:t>
+            </a:r>
+            <a:r>
+              <a:rPr lang="pt-BR" sz="2400" b="1" dirty="0" err="1" smtClean="0"/>
+              <a:t>php</a:t>
+            </a:r>
+            <a:endParaRPr lang="pt-BR" sz="2400" b="1" dirty="0" smtClean="0"/>
+          </a:p>
+          <a:p>
+            <a:r>
+              <a:rPr lang="pt-BR" sz="2400" dirty="0" smtClean="0"/>
+              <a:t>Neste exemplo, é simulado um sistema simples de notificação para uma carteira de ações .</a:t>
+            </a:r>
+            <a:endParaRPr lang="pt-BR" sz="2400" dirty="0"/>
           </a:p>
         </p:txBody>
       </p:sp>
@@ -3941,7 +4594,11 @@
           <a:p>
             <a:r>
               <a:rPr lang="pt-BR" dirty="0" smtClean="0"/>
-              <a:t>Referências </a:t>
+              <a:t>Objetivo do </a:t>
+            </a:r>
+            <a:r>
+              <a:rPr lang="pt-BR" dirty="0" err="1" smtClean="0"/>
+              <a:t>Observer</a:t>
             </a:r>
             <a:endParaRPr lang="pt-BR" dirty="0"/>
           </a:p>
@@ -3957,7 +4614,12 @@
             <p:ph idx="1"/>
           </p:nvPr>
         </p:nvSpPr>
-        <p:spPr/>
+        <p:spPr>
+          <a:xfrm>
+            <a:off x="457200" y="1285860"/>
+            <a:ext cx="8229600" cy="4840303"/>
+          </a:xfrm>
+        </p:spPr>
         <p:txBody>
           <a:bodyPr>
             <a:normAutofit/>
@@ -3965,19 +4627,297 @@
           <a:lstStyle/>
           <a:p>
             <a:r>
-              <a:rPr lang="pt-BR" sz="2000" dirty="0" smtClean="0">
-                <a:hlinkClick r:id="rId2"/>
-              </a:rPr>
-              <a:t>https://refactoring.guru/design-patterns/php</a:t>
-            </a:r>
-            <a:endParaRPr lang="pt-BR" sz="2000" dirty="0" smtClean="0"/>
-          </a:p>
-          <a:p>
+              <a:rPr lang="pt-BR" sz="2400" dirty="0" smtClean="0"/>
+              <a:t>Imagine que você tem dois tipos de objetos: um Cliente e uma Loja. O cliente está muito interessado em uma marca particular de um produto </a:t>
+            </a:r>
+          </a:p>
+          <a:p>
+            <a:r>
+              <a:rPr lang="pt-BR" sz="2400" dirty="0" smtClean="0"/>
+              <a:t>O cliente pode visitar a loja todos os dias e checar a disponibilidade do produto. Mas enquanto o produto ainda está a caminho, a maioria desses visitas serão em vão</a:t>
+            </a:r>
+            <a:r>
+              <a:rPr lang="pt-BR" sz="2400" dirty="0" smtClean="0"/>
+              <a:t>.</a:t>
+            </a:r>
+          </a:p>
+          <a:p>
+            <a:r>
+              <a:rPr lang="pt-BR" sz="2400" dirty="0" smtClean="0"/>
+              <a:t>O padrão </a:t>
+            </a:r>
+            <a:r>
+              <a:rPr lang="pt-BR" sz="2400" dirty="0" err="1" smtClean="0"/>
+              <a:t>Observer</a:t>
+            </a:r>
+            <a:r>
+              <a:rPr lang="pt-BR" sz="2400" dirty="0" smtClean="0"/>
+              <a:t> sugere que você adicione um mecanismo de assinatura para a classe </a:t>
+            </a:r>
+            <a:r>
+              <a:rPr lang="pt-BR" sz="2400" dirty="0" smtClean="0"/>
+              <a:t>Loja (nesse exemplo) para </a:t>
+            </a:r>
+            <a:r>
+              <a:rPr lang="pt-BR" sz="2400" dirty="0" smtClean="0"/>
+              <a:t>que objetos individuais possam assinar ou </a:t>
+            </a:r>
+            <a:r>
+              <a:rPr lang="pt-BR" sz="2400" dirty="0" err="1" smtClean="0"/>
+              <a:t>desassinar</a:t>
+            </a:r>
+            <a:r>
+              <a:rPr lang="pt-BR" sz="2400" dirty="0" smtClean="0"/>
+              <a:t> uma corrente de eventos vindo daquela </a:t>
+            </a:r>
+            <a:r>
+              <a:rPr lang="pt-BR" sz="2400" dirty="0" smtClean="0"/>
+              <a:t>Loja.</a:t>
+            </a:r>
+            <a:endParaRPr lang="pt-BR" dirty="0"/>
+          </a:p>
+        </p:txBody>
+      </p:sp>
+    </p:spTree>
+  </p:cSld>
+  <p:clrMapOvr>
+    <a:masterClrMapping/>
+  </p:clrMapOvr>
+</p:sld>
+</file>
+
+<file path=ppt/slides/slide9.xml><?xml version="1.0" encoding="utf-8"?>
+<p:sld xmlns:a="http://schemas.openxmlformats.org/drawingml/2006/main" xmlns:r="http://schemas.openxmlformats.org/officeDocument/2006/relationships" xmlns:p="http://schemas.openxmlformats.org/presentationml/2006/main">
+  <p:cSld>
+    <p:spTree>
+      <p:nvGrpSpPr>
+        <p:cNvPr id="1" name=""/>
+        <p:cNvGrpSpPr/>
+        <p:nvPr/>
+      </p:nvGrpSpPr>
+      <p:grpSpPr>
+        <a:xfrm>
+          <a:off x="0" y="0"/>
+          <a:ext cx="0" cy="0"/>
+          <a:chOff x="0" y="0"/>
+          <a:chExt cx="0" cy="0"/>
+        </a:xfrm>
+      </p:grpSpPr>
+      <p:sp>
+        <p:nvSpPr>
+          <p:cNvPr id="2" name="Título 1"/>
+          <p:cNvSpPr>
+            <a:spLocks noGrp="1"/>
+          </p:cNvSpPr>
+          <p:nvPr>
+            <p:ph type="title"/>
+          </p:nvPr>
+        </p:nvSpPr>
+        <p:spPr/>
+        <p:txBody>
+          <a:bodyPr/>
+          <a:lstStyle/>
+          <a:p>
+            <a:r>
+              <a:rPr lang="pt-BR" dirty="0" smtClean="0"/>
+              <a:t>Estrutura do </a:t>
+            </a:r>
+            <a:r>
+              <a:rPr lang="pt-BR" dirty="0" err="1" smtClean="0"/>
+              <a:t>Observer</a:t>
+            </a:r>
+            <a:endParaRPr lang="pt-BR" dirty="0"/>
+          </a:p>
+        </p:txBody>
+      </p:sp>
+      <p:sp>
+        <p:nvSpPr>
+          <p:cNvPr id="3" name="Espaço Reservado para Conteúdo 2"/>
+          <p:cNvSpPr>
+            <a:spLocks noGrp="1"/>
+          </p:cNvSpPr>
+          <p:nvPr>
+            <p:ph idx="1"/>
+          </p:nvPr>
+        </p:nvSpPr>
+        <p:spPr>
+          <a:xfrm>
+            <a:off x="457200" y="1600200"/>
+            <a:ext cx="4114800" cy="4525963"/>
+          </a:xfrm>
+        </p:spPr>
+        <p:txBody>
+          <a:bodyPr>
+            <a:normAutofit/>
+          </a:bodyPr>
+          <a:lstStyle/>
+          <a:p>
+            <a:pPr>
+              <a:buNone/>
+            </a:pPr>
             <a:r>
               <a:rPr lang="pt-BR" sz="2000" dirty="0" smtClean="0"/>
-              <a:t>https://refactoring.guru/design-patterns/what-is-pattern</a:t>
-            </a:r>
-            <a:endParaRPr lang="pt-BR" sz="2000" dirty="0"/>
+              <a:t>A estrutura básica do padrão é a seguinte: </a:t>
+            </a:r>
+          </a:p>
+          <a:p>
+            <a:r>
+              <a:rPr lang="pt-BR" sz="2000" b="1" dirty="0" smtClean="0"/>
+              <a:t>1. </a:t>
+            </a:r>
+            <a:r>
+              <a:rPr lang="pt-BR" sz="2000" b="1" dirty="0" err="1" smtClean="0"/>
+              <a:t>Subject</a:t>
+            </a:r>
+            <a:r>
+              <a:rPr lang="pt-BR" sz="2000" b="1" dirty="0" smtClean="0"/>
+              <a:t> (Observado)</a:t>
+            </a:r>
+          </a:p>
+          <a:p>
+            <a:r>
+              <a:rPr lang="pt-BR" sz="2000" dirty="0" smtClean="0"/>
+              <a:t>Mantém uma lista de </a:t>
+            </a:r>
+            <a:r>
+              <a:rPr lang="pt-BR" sz="2000" dirty="0" err="1" smtClean="0"/>
+              <a:t>observers</a:t>
+            </a:r>
+            <a:r>
+              <a:rPr lang="pt-BR" sz="2000" dirty="0" smtClean="0"/>
+              <a:t> inscritos.</a:t>
+            </a:r>
+          </a:p>
+          <a:p>
+            <a:r>
+              <a:rPr lang="pt-BR" sz="2000" dirty="0" smtClean="0"/>
+              <a:t>Oferece métodos para:</a:t>
+            </a:r>
+          </a:p>
+          <a:p>
+            <a:pPr lvl="1"/>
+            <a:r>
+              <a:rPr lang="pt-BR" sz="1800" dirty="0" err="1" smtClean="0"/>
+              <a:t>adicionarObserver</a:t>
+            </a:r>
+            <a:r>
+              <a:rPr lang="pt-BR" sz="1800" dirty="0" smtClean="0"/>
+              <a:t>()</a:t>
+            </a:r>
+          </a:p>
+          <a:p>
+            <a:pPr lvl="1"/>
+            <a:r>
+              <a:rPr lang="pt-BR" sz="1800" dirty="0" err="1" smtClean="0"/>
+              <a:t>removerObserver</a:t>
+            </a:r>
+            <a:r>
+              <a:rPr lang="pt-BR" sz="1800" dirty="0" smtClean="0"/>
+              <a:t>()</a:t>
+            </a:r>
+          </a:p>
+          <a:p>
+            <a:pPr lvl="1"/>
+            <a:r>
+              <a:rPr lang="pt-BR" sz="1800" dirty="0" err="1" smtClean="0"/>
+              <a:t>notificarObservers</a:t>
+            </a:r>
+            <a:r>
+              <a:rPr lang="pt-BR" sz="1800" dirty="0" smtClean="0"/>
+              <a:t>() (aciona a atualização em todos os </a:t>
+            </a:r>
+            <a:r>
+              <a:rPr lang="pt-BR" sz="1800" dirty="0" err="1" smtClean="0"/>
+              <a:t>observers</a:t>
+            </a:r>
+            <a:r>
+              <a:rPr lang="pt-BR" sz="1800" dirty="0" smtClean="0"/>
+              <a:t>).</a:t>
+            </a:r>
+          </a:p>
+          <a:p>
+            <a:pPr>
+              <a:buNone/>
+            </a:pPr>
+            <a:endParaRPr lang="pt-BR" dirty="0" smtClean="0"/>
+          </a:p>
+          <a:p>
+            <a:pPr>
+              <a:buNone/>
+            </a:pPr>
+            <a:endParaRPr lang="pt-BR" dirty="0"/>
+          </a:p>
+        </p:txBody>
+      </p:sp>
+      <p:pic>
+        <p:nvPicPr>
+          <p:cNvPr id="1026" name="Picture 2"/>
+          <p:cNvPicPr>
+            <a:picLocks noChangeAspect="1" noChangeArrowheads="1"/>
+          </p:cNvPicPr>
+          <p:nvPr/>
+        </p:nvPicPr>
+        <p:blipFill>
+          <a:blip r:embed="rId2"/>
+          <a:srcRect/>
+          <a:stretch>
+            <a:fillRect/>
+          </a:stretch>
+        </p:blipFill>
+        <p:spPr bwMode="auto">
+          <a:xfrm>
+            <a:off x="4214810" y="1714488"/>
+            <a:ext cx="4399514" cy="4429156"/>
+          </a:xfrm>
+          <a:prstGeom prst="rect">
+            <a:avLst/>
+          </a:prstGeom>
+          <a:noFill/>
+          <a:ln w="9525">
+            <a:noFill/>
+            <a:miter lim="800000"/>
+            <a:headEnd/>
+            <a:tailEnd/>
+          </a:ln>
+          <a:effectLst/>
+        </p:spPr>
+      </p:pic>
+      <p:sp>
+        <p:nvSpPr>
+          <p:cNvPr id="5" name="CaixaDeTexto 4"/>
+          <p:cNvSpPr txBox="1"/>
+          <p:nvPr/>
+        </p:nvSpPr>
+        <p:spPr>
+          <a:xfrm>
+            <a:off x="4500562" y="1285860"/>
+            <a:ext cx="4071966" cy="461665"/>
+          </a:xfrm>
+          <a:prstGeom prst="rect">
+            <a:avLst/>
+          </a:prstGeom>
+          <a:noFill/>
+        </p:spPr>
+        <p:txBody>
+          <a:bodyPr wrap="square" rtlCol="0">
+            <a:spAutoFit/>
+          </a:bodyPr>
+          <a:lstStyle/>
+          <a:p>
+            <a:pPr algn="ctr"/>
+            <a:r>
+              <a:rPr lang="pt-BR" sz="2400" dirty="0" err="1" smtClean="0"/>
+              <a:t>Observer</a:t>
+            </a:r>
+            <a:r>
+              <a:rPr lang="pt-BR" sz="2400" dirty="0" smtClean="0"/>
+              <a:t>.</a:t>
+            </a:r>
+            <a:r>
+              <a:rPr lang="pt-BR" sz="2400" dirty="0" err="1" smtClean="0"/>
+              <a:t>php</a:t>
+            </a:r>
+            <a:endParaRPr lang="pt-BR" sz="2400" dirty="0"/>
           </a:p>
         </p:txBody>
       </p:sp>

</xml_diff>